<commit_message>
Working pipe loading animation. Improve conatants
</commit_message>
<xml_diff>
--- a/assets/dirrectional-drill.pptx
+++ b/assets/dirrectional-drill.pptx
@@ -5,7 +5,7 @@
     <p:sldMasterId id="2147483648" r:id="rId1"/>
   </p:sldMasterIdLst>
   <p:notesMasterIdLst>
-    <p:notesMasterId r:id="rId9"/>
+    <p:notesMasterId r:id="rId10"/>
   </p:notesMasterIdLst>
   <p:sldIdLst>
     <p:sldId id="262" r:id="rId2"/>
@@ -14,7 +14,8 @@
     <p:sldId id="260" r:id="rId5"/>
     <p:sldId id="258" r:id="rId6"/>
     <p:sldId id="257" r:id="rId7"/>
-    <p:sldId id="259" r:id="rId8"/>
+    <p:sldId id="264" r:id="rId8"/>
+    <p:sldId id="259" r:id="rId9"/>
   </p:sldIdLst>
   <p:sldSz cx="12192000" cy="6858000"/>
   <p:notesSz cx="6858000" cy="9144000"/>
@@ -132,6 +133,7 @@
             <p14:sldId id="260"/>
             <p14:sldId id="258"/>
             <p14:sldId id="257"/>
+            <p14:sldId id="264"/>
             <p14:sldId id="259"/>
           </p14:sldIdLst>
         </p14:section>
@@ -153,15 +155,6 @@
     </p:ext>
   </p:extLst>
 </p:presentation>
-</file>
-
-<file path=ppt/revisionInfo.xml><?xml version="1.0" encoding="utf-8"?>
-<p1510:revInfo xmlns:a="http://schemas.openxmlformats.org/drawingml/2006/main" xmlns:r="http://schemas.openxmlformats.org/officeDocument/2006/relationships" xmlns:p1510="http://schemas.microsoft.com/office/powerpoint/2015/10/main">
-  <p1510:revLst>
-    <p1510:client id="{28F82F88-CD52-DC4E-965E-CC54AF67373C}" v="1356" dt="2022-07-09T08:54:08.700"/>
-    <p1510:client id="{F5552F6C-83D9-7D4C-9AE2-35DE4E4494A6}" v="35" dt="2022-07-08T19:08:21.284"/>
-  </p1510:revLst>
-</p1510:revInfo>
 </file>
 
 <file path=ppt/notesMasters/notesMaster1.xml><?xml version="1.0" encoding="utf-8"?>
@@ -16171,6 +16164,989 @@
           <a:chExt cx="0" cy="0"/>
         </a:xfrm>
       </p:grpSpPr>
+      <p:sp>
+        <p:nvSpPr>
+          <p:cNvPr id="31" name="Rectangle 30">
+            <a:extLst>
+              <a:ext uri="{FF2B5EF4-FFF2-40B4-BE49-F238E27FC236}">
+                <a16:creationId xmlns:a16="http://schemas.microsoft.com/office/drawing/2014/main" id="{1C7C52AA-BFB9-C96E-C8CC-1747DD5E926D}"/>
+              </a:ext>
+            </a:extLst>
+          </p:cNvPr>
+          <p:cNvSpPr/>
+          <p:nvPr/>
+        </p:nvSpPr>
+        <p:spPr>
+          <a:xfrm>
+            <a:off x="228584" y="3683104"/>
+            <a:ext cx="396000" cy="1325830"/>
+          </a:xfrm>
+          <a:prstGeom prst="rect">
+            <a:avLst/>
+          </a:prstGeom>
+          <a:solidFill>
+            <a:srgbClr val="414143"/>
+          </a:solidFill>
+          <a:ln>
+            <a:noFill/>
+          </a:ln>
+        </p:spPr>
+        <p:style>
+          <a:lnRef idx="2">
+            <a:schemeClr val="accent1">
+              <a:shade val="50000"/>
+            </a:schemeClr>
+          </a:lnRef>
+          <a:fillRef idx="1">
+            <a:schemeClr val="accent1"/>
+          </a:fillRef>
+          <a:effectRef idx="0">
+            <a:schemeClr val="accent1"/>
+          </a:effectRef>
+          <a:fontRef idx="minor">
+            <a:schemeClr val="lt1"/>
+          </a:fontRef>
+        </p:style>
+        <p:txBody>
+          <a:bodyPr rtlCol="0" anchor="ctr"/>
+          <a:lstStyle/>
+          <a:p>
+            <a:endParaRPr lang="en-NO" sz="2000" b="1" dirty="0">
+              <a:latin typeface="Calibri" panose="020F0502020204030204" pitchFamily="34" charset="0"/>
+              <a:cs typeface="Calibri" panose="020F0502020204030204" pitchFamily="34" charset="0"/>
+            </a:endParaRPr>
+          </a:p>
+        </p:txBody>
+      </p:sp>
+      <p:sp>
+        <p:nvSpPr>
+          <p:cNvPr id="33" name="Rectangle 32">
+            <a:extLst>
+              <a:ext uri="{FF2B5EF4-FFF2-40B4-BE49-F238E27FC236}">
+                <a16:creationId xmlns:a16="http://schemas.microsoft.com/office/drawing/2014/main" id="{31CCD686-2B5D-EF90-CB46-15CA43CD0BC5}"/>
+              </a:ext>
+            </a:extLst>
+          </p:cNvPr>
+          <p:cNvSpPr/>
+          <p:nvPr/>
+        </p:nvSpPr>
+        <p:spPr>
+          <a:xfrm>
+            <a:off x="5574588" y="3702152"/>
+            <a:ext cx="396000" cy="1325830"/>
+          </a:xfrm>
+          <a:prstGeom prst="rect">
+            <a:avLst/>
+          </a:prstGeom>
+          <a:solidFill>
+            <a:srgbClr val="414143"/>
+          </a:solidFill>
+          <a:ln>
+            <a:noFill/>
+          </a:ln>
+        </p:spPr>
+        <p:style>
+          <a:lnRef idx="2">
+            <a:schemeClr val="accent1">
+              <a:shade val="50000"/>
+            </a:schemeClr>
+          </a:lnRef>
+          <a:fillRef idx="1">
+            <a:schemeClr val="accent1"/>
+          </a:fillRef>
+          <a:effectRef idx="0">
+            <a:schemeClr val="accent1"/>
+          </a:effectRef>
+          <a:fontRef idx="minor">
+            <a:schemeClr val="lt1"/>
+          </a:fontRef>
+        </p:style>
+        <p:txBody>
+          <a:bodyPr rtlCol="0" anchor="ctr"/>
+          <a:lstStyle/>
+          <a:p>
+            <a:endParaRPr lang="en-NO" sz="2000" b="1" dirty="0">
+              <a:latin typeface="Calibri" panose="020F0502020204030204" pitchFamily="34" charset="0"/>
+              <a:cs typeface="Calibri" panose="020F0502020204030204" pitchFamily="34" charset="0"/>
+            </a:endParaRPr>
+          </a:p>
+        </p:txBody>
+      </p:sp>
+      <p:sp>
+        <p:nvSpPr>
+          <p:cNvPr id="34" name="Rectangle 33">
+            <a:extLst>
+              <a:ext uri="{FF2B5EF4-FFF2-40B4-BE49-F238E27FC236}">
+                <a16:creationId xmlns:a16="http://schemas.microsoft.com/office/drawing/2014/main" id="{3A83E1D2-08F5-0A5F-C988-69625AA66DCA}"/>
+              </a:ext>
+            </a:extLst>
+          </p:cNvPr>
+          <p:cNvSpPr/>
+          <p:nvPr/>
+        </p:nvSpPr>
+        <p:spPr>
+          <a:xfrm>
+            <a:off x="10920589" y="3702152"/>
+            <a:ext cx="396000" cy="1325830"/>
+          </a:xfrm>
+          <a:prstGeom prst="rect">
+            <a:avLst/>
+          </a:prstGeom>
+          <a:solidFill>
+            <a:srgbClr val="414143"/>
+          </a:solidFill>
+          <a:ln>
+            <a:noFill/>
+          </a:ln>
+        </p:spPr>
+        <p:style>
+          <a:lnRef idx="2">
+            <a:schemeClr val="accent1">
+              <a:shade val="50000"/>
+            </a:schemeClr>
+          </a:lnRef>
+          <a:fillRef idx="1">
+            <a:schemeClr val="accent1"/>
+          </a:fillRef>
+          <a:effectRef idx="0">
+            <a:schemeClr val="accent1"/>
+          </a:effectRef>
+          <a:fontRef idx="minor">
+            <a:schemeClr val="lt1"/>
+          </a:fontRef>
+        </p:style>
+        <p:txBody>
+          <a:bodyPr rtlCol="0" anchor="ctr"/>
+          <a:lstStyle/>
+          <a:p>
+            <a:endParaRPr lang="en-NO" sz="2000" b="1" dirty="0">
+              <a:latin typeface="Calibri" panose="020F0502020204030204" pitchFamily="34" charset="0"/>
+              <a:cs typeface="Calibri" panose="020F0502020204030204" pitchFamily="34" charset="0"/>
+            </a:endParaRPr>
+          </a:p>
+        </p:txBody>
+      </p:sp>
+      <p:sp>
+        <p:nvSpPr>
+          <p:cNvPr id="2" name="Rectangle 1">
+            <a:extLst>
+              <a:ext uri="{FF2B5EF4-FFF2-40B4-BE49-F238E27FC236}">
+                <a16:creationId xmlns:a16="http://schemas.microsoft.com/office/drawing/2014/main" id="{BE7F57F6-E9E8-0D95-FDE9-D8AE8EC190F9}"/>
+              </a:ext>
+            </a:extLst>
+          </p:cNvPr>
+          <p:cNvSpPr/>
+          <p:nvPr/>
+        </p:nvSpPr>
+        <p:spPr>
+          <a:xfrm>
+            <a:off x="495047" y="3139055"/>
+            <a:ext cx="10692000" cy="368587"/>
+          </a:xfrm>
+          <a:prstGeom prst="rect">
+            <a:avLst/>
+          </a:prstGeom>
+          <a:gradFill flip="none" rotWithShape="1">
+            <a:gsLst>
+              <a:gs pos="50000">
+                <a:srgbClr val="67584C"/>
+              </a:gs>
+              <a:gs pos="0">
+                <a:srgbClr val="26292D"/>
+              </a:gs>
+              <a:gs pos="99000">
+                <a:srgbClr val="26292D"/>
+              </a:gs>
+            </a:gsLst>
+            <a:lin ang="5400000" scaled="0"/>
+            <a:tileRect/>
+          </a:gradFill>
+          <a:ln>
+            <a:noFill/>
+          </a:ln>
+        </p:spPr>
+        <p:style>
+          <a:lnRef idx="2">
+            <a:schemeClr val="accent1">
+              <a:shade val="50000"/>
+            </a:schemeClr>
+          </a:lnRef>
+          <a:fillRef idx="1">
+            <a:schemeClr val="accent1"/>
+          </a:fillRef>
+          <a:effectRef idx="0">
+            <a:schemeClr val="accent1"/>
+          </a:effectRef>
+          <a:fontRef idx="minor">
+            <a:schemeClr val="lt1"/>
+          </a:fontRef>
+        </p:style>
+        <p:txBody>
+          <a:bodyPr rtlCol="0" anchor="ctr"/>
+          <a:lstStyle/>
+          <a:p>
+            <a:endParaRPr lang="en-NO" sz="2000" b="1">
+              <a:latin typeface="Calibri" panose="020F0502020204030204" pitchFamily="34" charset="0"/>
+              <a:cs typeface="Calibri" panose="020F0502020204030204" pitchFamily="34" charset="0"/>
+            </a:endParaRPr>
+          </a:p>
+        </p:txBody>
+      </p:sp>
+      <p:sp>
+        <p:nvSpPr>
+          <p:cNvPr id="5" name="Trapezium 4">
+            <a:extLst>
+              <a:ext uri="{FF2B5EF4-FFF2-40B4-BE49-F238E27FC236}">
+                <a16:creationId xmlns:a16="http://schemas.microsoft.com/office/drawing/2014/main" id="{39B6249D-5107-B5B9-851C-2A9AF6DF45BA}"/>
+              </a:ext>
+            </a:extLst>
+          </p:cNvPr>
+          <p:cNvSpPr/>
+          <p:nvPr/>
+        </p:nvSpPr>
+        <p:spPr>
+          <a:xfrm flipV="1">
+            <a:off x="1744528" y="2254162"/>
+            <a:ext cx="5002924" cy="125583"/>
+          </a:xfrm>
+          <a:prstGeom prst="trapezoid">
+            <a:avLst>
+              <a:gd name="adj" fmla="val 35976"/>
+            </a:avLst>
+          </a:prstGeom>
+          <a:solidFill>
+            <a:srgbClr val="E3AB00"/>
+          </a:solidFill>
+          <a:ln>
+            <a:noFill/>
+          </a:ln>
+        </p:spPr>
+        <p:style>
+          <a:lnRef idx="2">
+            <a:schemeClr val="accent1">
+              <a:shade val="50000"/>
+            </a:schemeClr>
+          </a:lnRef>
+          <a:fillRef idx="1">
+            <a:schemeClr val="accent1"/>
+          </a:fillRef>
+          <a:effectRef idx="0">
+            <a:schemeClr val="accent1"/>
+          </a:effectRef>
+          <a:fontRef idx="minor">
+            <a:schemeClr val="lt1"/>
+          </a:fontRef>
+        </p:style>
+        <p:txBody>
+          <a:bodyPr rtlCol="0" anchor="ctr"/>
+          <a:lstStyle/>
+          <a:p>
+            <a:pPr algn="ctr"/>
+            <a:endParaRPr lang="en-US"/>
+          </a:p>
+        </p:txBody>
+      </p:sp>
+      <p:sp>
+        <p:nvSpPr>
+          <p:cNvPr id="17" name="Rectangle 16">
+            <a:extLst>
+              <a:ext uri="{FF2B5EF4-FFF2-40B4-BE49-F238E27FC236}">
+                <a16:creationId xmlns:a16="http://schemas.microsoft.com/office/drawing/2014/main" id="{1F79378A-107B-3D7B-6A16-B463DC2372B8}"/>
+              </a:ext>
+            </a:extLst>
+          </p:cNvPr>
+          <p:cNvSpPr/>
+          <p:nvPr/>
+        </p:nvSpPr>
+        <p:spPr>
+          <a:xfrm>
+            <a:off x="495047" y="2664671"/>
+            <a:ext cx="10692000" cy="368587"/>
+          </a:xfrm>
+          <a:prstGeom prst="rect">
+            <a:avLst/>
+          </a:prstGeom>
+          <a:gradFill flip="none" rotWithShape="1">
+            <a:gsLst>
+              <a:gs pos="50000">
+                <a:srgbClr val="67584C"/>
+              </a:gs>
+              <a:gs pos="0">
+                <a:srgbClr val="26292D"/>
+              </a:gs>
+              <a:gs pos="99000">
+                <a:srgbClr val="26292D"/>
+              </a:gs>
+            </a:gsLst>
+            <a:lin ang="5400000" scaled="0"/>
+            <a:tileRect/>
+          </a:gradFill>
+          <a:ln>
+            <a:noFill/>
+          </a:ln>
+        </p:spPr>
+        <p:style>
+          <a:lnRef idx="2">
+            <a:schemeClr val="accent1">
+              <a:shade val="50000"/>
+            </a:schemeClr>
+          </a:lnRef>
+          <a:fillRef idx="1">
+            <a:schemeClr val="accent1"/>
+          </a:fillRef>
+          <a:effectRef idx="0">
+            <a:schemeClr val="accent1"/>
+          </a:effectRef>
+          <a:fontRef idx="minor">
+            <a:schemeClr val="lt1"/>
+          </a:fontRef>
+        </p:style>
+        <p:txBody>
+          <a:bodyPr rtlCol="0" anchor="ctr"/>
+          <a:lstStyle/>
+          <a:p>
+            <a:endParaRPr lang="en-NO" sz="2000" b="1">
+              <a:latin typeface="Calibri" panose="020F0502020204030204" pitchFamily="34" charset="0"/>
+              <a:cs typeface="Calibri" panose="020F0502020204030204" pitchFamily="34" charset="0"/>
+            </a:endParaRPr>
+          </a:p>
+        </p:txBody>
+      </p:sp>
+      <p:sp>
+        <p:nvSpPr>
+          <p:cNvPr id="18" name="Rectangle 17">
+            <a:extLst>
+              <a:ext uri="{FF2B5EF4-FFF2-40B4-BE49-F238E27FC236}">
+                <a16:creationId xmlns:a16="http://schemas.microsoft.com/office/drawing/2014/main" id="{C3A1C1DB-5AE8-A62D-4C6F-38CD2B120DA1}"/>
+              </a:ext>
+            </a:extLst>
+          </p:cNvPr>
+          <p:cNvSpPr/>
+          <p:nvPr/>
+        </p:nvSpPr>
+        <p:spPr>
+          <a:xfrm>
+            <a:off x="495047" y="2190286"/>
+            <a:ext cx="10692000" cy="368587"/>
+          </a:xfrm>
+          <a:prstGeom prst="rect">
+            <a:avLst/>
+          </a:prstGeom>
+          <a:gradFill flip="none" rotWithShape="1">
+            <a:gsLst>
+              <a:gs pos="50000">
+                <a:srgbClr val="67584C"/>
+              </a:gs>
+              <a:gs pos="0">
+                <a:srgbClr val="26292D"/>
+              </a:gs>
+              <a:gs pos="99000">
+                <a:srgbClr val="26292D"/>
+              </a:gs>
+            </a:gsLst>
+            <a:lin ang="5400000" scaled="0"/>
+            <a:tileRect/>
+          </a:gradFill>
+          <a:ln>
+            <a:noFill/>
+          </a:ln>
+        </p:spPr>
+        <p:style>
+          <a:lnRef idx="2">
+            <a:schemeClr val="accent1">
+              <a:shade val="50000"/>
+            </a:schemeClr>
+          </a:lnRef>
+          <a:fillRef idx="1">
+            <a:schemeClr val="accent1"/>
+          </a:fillRef>
+          <a:effectRef idx="0">
+            <a:schemeClr val="accent1"/>
+          </a:effectRef>
+          <a:fontRef idx="minor">
+            <a:schemeClr val="lt1"/>
+          </a:fontRef>
+        </p:style>
+        <p:txBody>
+          <a:bodyPr rtlCol="0" anchor="ctr"/>
+          <a:lstStyle/>
+          <a:p>
+            <a:endParaRPr lang="en-NO" sz="2000" b="1">
+              <a:latin typeface="Calibri" panose="020F0502020204030204" pitchFamily="34" charset="0"/>
+              <a:cs typeface="Calibri" panose="020F0502020204030204" pitchFamily="34" charset="0"/>
+            </a:endParaRPr>
+          </a:p>
+        </p:txBody>
+      </p:sp>
+      <p:sp>
+        <p:nvSpPr>
+          <p:cNvPr id="19" name="Rectangle 18">
+            <a:extLst>
+              <a:ext uri="{FF2B5EF4-FFF2-40B4-BE49-F238E27FC236}">
+                <a16:creationId xmlns:a16="http://schemas.microsoft.com/office/drawing/2014/main" id="{4714BE2E-D550-2EB4-87BC-A69C00DBA88E}"/>
+              </a:ext>
+            </a:extLst>
+          </p:cNvPr>
+          <p:cNvSpPr/>
+          <p:nvPr/>
+        </p:nvSpPr>
+        <p:spPr>
+          <a:xfrm>
+            <a:off x="495047" y="1715901"/>
+            <a:ext cx="10692000" cy="368587"/>
+          </a:xfrm>
+          <a:prstGeom prst="rect">
+            <a:avLst/>
+          </a:prstGeom>
+          <a:gradFill flip="none" rotWithShape="1">
+            <a:gsLst>
+              <a:gs pos="50000">
+                <a:srgbClr val="67584C"/>
+              </a:gs>
+              <a:gs pos="0">
+                <a:srgbClr val="26292D"/>
+              </a:gs>
+              <a:gs pos="99000">
+                <a:srgbClr val="26292D"/>
+              </a:gs>
+            </a:gsLst>
+            <a:lin ang="5400000" scaled="0"/>
+            <a:tileRect/>
+          </a:gradFill>
+          <a:ln>
+            <a:noFill/>
+          </a:ln>
+        </p:spPr>
+        <p:style>
+          <a:lnRef idx="2">
+            <a:schemeClr val="accent1">
+              <a:shade val="50000"/>
+            </a:schemeClr>
+          </a:lnRef>
+          <a:fillRef idx="1">
+            <a:schemeClr val="accent1"/>
+          </a:fillRef>
+          <a:effectRef idx="0">
+            <a:schemeClr val="accent1"/>
+          </a:effectRef>
+          <a:fontRef idx="minor">
+            <a:schemeClr val="lt1"/>
+          </a:fontRef>
+        </p:style>
+        <p:txBody>
+          <a:bodyPr rtlCol="0" anchor="ctr"/>
+          <a:lstStyle/>
+          <a:p>
+            <a:endParaRPr lang="en-NO" sz="2000" b="1">
+              <a:latin typeface="Calibri" panose="020F0502020204030204" pitchFamily="34" charset="0"/>
+              <a:cs typeface="Calibri" panose="020F0502020204030204" pitchFamily="34" charset="0"/>
+            </a:endParaRPr>
+          </a:p>
+        </p:txBody>
+      </p:sp>
+      <p:sp>
+        <p:nvSpPr>
+          <p:cNvPr id="16" name="Rectangle 15">
+            <a:extLst>
+              <a:ext uri="{FF2B5EF4-FFF2-40B4-BE49-F238E27FC236}">
+                <a16:creationId xmlns:a16="http://schemas.microsoft.com/office/drawing/2014/main" id="{55D4B9FF-BBF2-BF5E-988C-B86C7208B565}"/>
+              </a:ext>
+            </a:extLst>
+          </p:cNvPr>
+          <p:cNvSpPr/>
+          <p:nvPr/>
+        </p:nvSpPr>
+        <p:spPr>
+          <a:xfrm>
+            <a:off x="10920589" y="1490893"/>
+            <a:ext cx="396000" cy="2241755"/>
+          </a:xfrm>
+          <a:prstGeom prst="rect">
+            <a:avLst/>
+          </a:prstGeom>
+          <a:solidFill>
+            <a:srgbClr val="E3AB00"/>
+          </a:solidFill>
+          <a:ln>
+            <a:noFill/>
+          </a:ln>
+        </p:spPr>
+        <p:style>
+          <a:lnRef idx="2">
+            <a:schemeClr val="accent1">
+              <a:shade val="50000"/>
+            </a:schemeClr>
+          </a:lnRef>
+          <a:fillRef idx="1">
+            <a:schemeClr val="accent1"/>
+          </a:fillRef>
+          <a:effectRef idx="0">
+            <a:schemeClr val="accent1"/>
+          </a:effectRef>
+          <a:fontRef idx="minor">
+            <a:schemeClr val="lt1"/>
+          </a:fontRef>
+        </p:style>
+        <p:txBody>
+          <a:bodyPr rtlCol="0" anchor="ctr"/>
+          <a:lstStyle/>
+          <a:p>
+            <a:pPr algn="ctr"/>
+            <a:endParaRPr lang="en-NO"/>
+          </a:p>
+        </p:txBody>
+      </p:sp>
+      <p:sp>
+        <p:nvSpPr>
+          <p:cNvPr id="20" name="Rectangle 19">
+            <a:extLst>
+              <a:ext uri="{FF2B5EF4-FFF2-40B4-BE49-F238E27FC236}">
+                <a16:creationId xmlns:a16="http://schemas.microsoft.com/office/drawing/2014/main" id="{CB80C0E0-58BA-34A6-285F-625EFC0D2C5D}"/>
+              </a:ext>
+            </a:extLst>
+          </p:cNvPr>
+          <p:cNvSpPr/>
+          <p:nvPr/>
+        </p:nvSpPr>
+        <p:spPr>
+          <a:xfrm>
+            <a:off x="228587" y="1490893"/>
+            <a:ext cx="396000" cy="2241755"/>
+          </a:xfrm>
+          <a:prstGeom prst="rect">
+            <a:avLst/>
+          </a:prstGeom>
+          <a:solidFill>
+            <a:srgbClr val="E3AB00"/>
+          </a:solidFill>
+          <a:ln>
+            <a:noFill/>
+          </a:ln>
+        </p:spPr>
+        <p:style>
+          <a:lnRef idx="2">
+            <a:schemeClr val="accent1">
+              <a:shade val="50000"/>
+            </a:schemeClr>
+          </a:lnRef>
+          <a:fillRef idx="1">
+            <a:schemeClr val="accent1"/>
+          </a:fillRef>
+          <a:effectRef idx="0">
+            <a:schemeClr val="accent1"/>
+          </a:effectRef>
+          <a:fontRef idx="minor">
+            <a:schemeClr val="lt1"/>
+          </a:fontRef>
+        </p:style>
+        <p:txBody>
+          <a:bodyPr rtlCol="0" anchor="ctr"/>
+          <a:lstStyle/>
+          <a:p>
+            <a:pPr algn="ctr"/>
+            <a:endParaRPr lang="en-NO" dirty="0"/>
+          </a:p>
+        </p:txBody>
+      </p:sp>
+      <p:sp>
+        <p:nvSpPr>
+          <p:cNvPr id="21" name="Rectangle 20">
+            <a:extLst>
+              <a:ext uri="{FF2B5EF4-FFF2-40B4-BE49-F238E27FC236}">
+                <a16:creationId xmlns:a16="http://schemas.microsoft.com/office/drawing/2014/main" id="{2E8C4D20-64A8-92CC-263E-995529F57D09}"/>
+              </a:ext>
+            </a:extLst>
+          </p:cNvPr>
+          <p:cNvSpPr/>
+          <p:nvPr/>
+        </p:nvSpPr>
+        <p:spPr>
+          <a:xfrm>
+            <a:off x="5574588" y="1490893"/>
+            <a:ext cx="396000" cy="2241755"/>
+          </a:xfrm>
+          <a:prstGeom prst="rect">
+            <a:avLst/>
+          </a:prstGeom>
+          <a:solidFill>
+            <a:srgbClr val="E3AB00"/>
+          </a:solidFill>
+          <a:ln>
+            <a:noFill/>
+          </a:ln>
+        </p:spPr>
+        <p:style>
+          <a:lnRef idx="2">
+            <a:schemeClr val="accent1">
+              <a:shade val="50000"/>
+            </a:schemeClr>
+          </a:lnRef>
+          <a:fillRef idx="1">
+            <a:schemeClr val="accent1"/>
+          </a:fillRef>
+          <a:effectRef idx="0">
+            <a:schemeClr val="accent1"/>
+          </a:effectRef>
+          <a:fontRef idx="minor">
+            <a:schemeClr val="lt1"/>
+          </a:fontRef>
+        </p:style>
+        <p:txBody>
+          <a:bodyPr rtlCol="0" anchor="ctr"/>
+          <a:lstStyle/>
+          <a:p>
+            <a:pPr algn="ctr"/>
+            <a:endParaRPr lang="en-NO"/>
+          </a:p>
+        </p:txBody>
+      </p:sp>
+      <p:sp>
+        <p:nvSpPr>
+          <p:cNvPr id="25" name="Rectangle 24">
+            <a:extLst>
+              <a:ext uri="{FF2B5EF4-FFF2-40B4-BE49-F238E27FC236}">
+                <a16:creationId xmlns:a16="http://schemas.microsoft.com/office/drawing/2014/main" id="{1B6A3D83-79E1-851E-6A78-8FCB92578C13}"/>
+              </a:ext>
+            </a:extLst>
+          </p:cNvPr>
+          <p:cNvSpPr/>
+          <p:nvPr/>
+        </p:nvSpPr>
+        <p:spPr>
+          <a:xfrm>
+            <a:off x="228586" y="3544571"/>
+            <a:ext cx="11052000" cy="194213"/>
+          </a:xfrm>
+          <a:prstGeom prst="rect">
+            <a:avLst/>
+          </a:prstGeom>
+          <a:solidFill>
+            <a:srgbClr val="E3AB00"/>
+          </a:solidFill>
+          <a:ln>
+            <a:noFill/>
+          </a:ln>
+        </p:spPr>
+        <p:style>
+          <a:lnRef idx="2">
+            <a:schemeClr val="accent1">
+              <a:shade val="50000"/>
+            </a:schemeClr>
+          </a:lnRef>
+          <a:fillRef idx="1">
+            <a:schemeClr val="accent1"/>
+          </a:fillRef>
+          <a:effectRef idx="0">
+            <a:schemeClr val="accent1"/>
+          </a:effectRef>
+          <a:fontRef idx="minor">
+            <a:schemeClr val="lt1"/>
+          </a:fontRef>
+        </p:style>
+        <p:txBody>
+          <a:bodyPr rtlCol="0" anchor="ctr"/>
+          <a:lstStyle/>
+          <a:p>
+            <a:pPr algn="ctr"/>
+            <a:endParaRPr lang="en-NO"/>
+          </a:p>
+        </p:txBody>
+      </p:sp>
+      <p:sp>
+        <p:nvSpPr>
+          <p:cNvPr id="26" name="Rectangle 25">
+            <a:extLst>
+              <a:ext uri="{FF2B5EF4-FFF2-40B4-BE49-F238E27FC236}">
+                <a16:creationId xmlns:a16="http://schemas.microsoft.com/office/drawing/2014/main" id="{E4306F33-79CD-EC5D-4C49-E7C988306B83}"/>
+              </a:ext>
+            </a:extLst>
+          </p:cNvPr>
+          <p:cNvSpPr/>
+          <p:nvPr/>
+        </p:nvSpPr>
+        <p:spPr>
+          <a:xfrm>
+            <a:off x="228585" y="2514665"/>
+            <a:ext cx="11052000" cy="194213"/>
+          </a:xfrm>
+          <a:prstGeom prst="rect">
+            <a:avLst/>
+          </a:prstGeom>
+          <a:solidFill>
+            <a:srgbClr val="E3AB00"/>
+          </a:solidFill>
+          <a:ln>
+            <a:noFill/>
+          </a:ln>
+        </p:spPr>
+        <p:style>
+          <a:lnRef idx="2">
+            <a:schemeClr val="accent1">
+              <a:shade val="50000"/>
+            </a:schemeClr>
+          </a:lnRef>
+          <a:fillRef idx="1">
+            <a:schemeClr val="accent1"/>
+          </a:fillRef>
+          <a:effectRef idx="0">
+            <a:schemeClr val="accent1"/>
+          </a:effectRef>
+          <a:fontRef idx="minor">
+            <a:schemeClr val="lt1"/>
+          </a:fontRef>
+        </p:style>
+        <p:txBody>
+          <a:bodyPr rtlCol="0" anchor="ctr"/>
+          <a:lstStyle/>
+          <a:p>
+            <a:pPr algn="ctr"/>
+            <a:endParaRPr lang="en-NO"/>
+          </a:p>
+        </p:txBody>
+      </p:sp>
+      <p:sp>
+        <p:nvSpPr>
+          <p:cNvPr id="27" name="Rectangle 26">
+            <a:extLst>
+              <a:ext uri="{FF2B5EF4-FFF2-40B4-BE49-F238E27FC236}">
+                <a16:creationId xmlns:a16="http://schemas.microsoft.com/office/drawing/2014/main" id="{AD1BDD6F-6463-E0C9-87A5-94D4B2DEEEF3}"/>
+              </a:ext>
+            </a:extLst>
+          </p:cNvPr>
+          <p:cNvSpPr/>
+          <p:nvPr/>
+        </p:nvSpPr>
+        <p:spPr>
+          <a:xfrm>
+            <a:off x="228585" y="1490893"/>
+            <a:ext cx="11052000" cy="194213"/>
+          </a:xfrm>
+          <a:prstGeom prst="rect">
+            <a:avLst/>
+          </a:prstGeom>
+          <a:solidFill>
+            <a:srgbClr val="E3AB00"/>
+          </a:solidFill>
+          <a:ln>
+            <a:noFill/>
+          </a:ln>
+        </p:spPr>
+        <p:style>
+          <a:lnRef idx="2">
+            <a:schemeClr val="accent1">
+              <a:shade val="50000"/>
+            </a:schemeClr>
+          </a:lnRef>
+          <a:fillRef idx="1">
+            <a:schemeClr val="accent1"/>
+          </a:fillRef>
+          <a:effectRef idx="0">
+            <a:schemeClr val="accent1"/>
+          </a:effectRef>
+          <a:fontRef idx="minor">
+            <a:schemeClr val="lt1"/>
+          </a:fontRef>
+        </p:style>
+        <p:txBody>
+          <a:bodyPr rtlCol="0" anchor="ctr"/>
+          <a:lstStyle/>
+          <a:p>
+            <a:pPr algn="ctr"/>
+            <a:endParaRPr lang="en-NO"/>
+          </a:p>
+        </p:txBody>
+      </p:sp>
+      <p:sp>
+        <p:nvSpPr>
+          <p:cNvPr id="28" name="Rectangle 27">
+            <a:extLst>
+              <a:ext uri="{FF2B5EF4-FFF2-40B4-BE49-F238E27FC236}">
+                <a16:creationId xmlns:a16="http://schemas.microsoft.com/office/drawing/2014/main" id="{FD9D45D2-BD89-BB07-BAB9-D3E9C8A03F44}"/>
+              </a:ext>
+            </a:extLst>
+          </p:cNvPr>
+          <p:cNvSpPr/>
+          <p:nvPr/>
+        </p:nvSpPr>
+        <p:spPr>
+          <a:xfrm rot="1796737" flipV="1">
+            <a:off x="1114296" y="2515414"/>
+            <a:ext cx="4107501" cy="106019"/>
+          </a:xfrm>
+          <a:prstGeom prst="rect">
+            <a:avLst/>
+          </a:prstGeom>
+          <a:solidFill>
+            <a:srgbClr val="E3AB00"/>
+          </a:solidFill>
+          <a:ln>
+            <a:noFill/>
+          </a:ln>
+        </p:spPr>
+        <p:style>
+          <a:lnRef idx="2">
+            <a:schemeClr val="accent1">
+              <a:shade val="50000"/>
+            </a:schemeClr>
+          </a:lnRef>
+          <a:fillRef idx="1">
+            <a:schemeClr val="accent1"/>
+          </a:fillRef>
+          <a:effectRef idx="0">
+            <a:schemeClr val="accent1"/>
+          </a:effectRef>
+          <a:fontRef idx="minor">
+            <a:schemeClr val="lt1"/>
+          </a:fontRef>
+        </p:style>
+        <p:txBody>
+          <a:bodyPr rtlCol="0" anchor="ctr"/>
+          <a:lstStyle/>
+          <a:p>
+            <a:pPr algn="ctr"/>
+            <a:endParaRPr lang="en-NO"/>
+          </a:p>
+        </p:txBody>
+      </p:sp>
+      <p:sp>
+        <p:nvSpPr>
+          <p:cNvPr id="29" name="Rectangle 28">
+            <a:extLst>
+              <a:ext uri="{FF2B5EF4-FFF2-40B4-BE49-F238E27FC236}">
+                <a16:creationId xmlns:a16="http://schemas.microsoft.com/office/drawing/2014/main" id="{2A2E0541-A9B3-B2DC-0115-56804A11E4E5}"/>
+              </a:ext>
+            </a:extLst>
+          </p:cNvPr>
+          <p:cNvSpPr/>
+          <p:nvPr/>
+        </p:nvSpPr>
+        <p:spPr>
+          <a:xfrm rot="1796737" flipV="1">
+            <a:off x="6460297" y="2565470"/>
+            <a:ext cx="4107501" cy="106019"/>
+          </a:xfrm>
+          <a:prstGeom prst="rect">
+            <a:avLst/>
+          </a:prstGeom>
+          <a:solidFill>
+            <a:srgbClr val="E3AB00"/>
+          </a:solidFill>
+          <a:ln>
+            <a:noFill/>
+          </a:ln>
+        </p:spPr>
+        <p:style>
+          <a:lnRef idx="2">
+            <a:schemeClr val="accent1">
+              <a:shade val="50000"/>
+            </a:schemeClr>
+          </a:lnRef>
+          <a:fillRef idx="1">
+            <a:schemeClr val="accent1"/>
+          </a:fillRef>
+          <a:effectRef idx="0">
+            <a:schemeClr val="accent1"/>
+          </a:effectRef>
+          <a:fontRef idx="minor">
+            <a:schemeClr val="lt1"/>
+          </a:fontRef>
+        </p:style>
+        <p:txBody>
+          <a:bodyPr rtlCol="0" anchor="ctr"/>
+          <a:lstStyle/>
+          <a:p>
+            <a:pPr algn="ctr"/>
+            <a:endParaRPr lang="en-NO"/>
+          </a:p>
+        </p:txBody>
+      </p:sp>
+      <p:sp>
+        <p:nvSpPr>
+          <p:cNvPr id="55" name="Rectangle 54">
+            <a:extLst>
+              <a:ext uri="{FF2B5EF4-FFF2-40B4-BE49-F238E27FC236}">
+                <a16:creationId xmlns:a16="http://schemas.microsoft.com/office/drawing/2014/main" id="{EEEF0ED5-13C5-58FA-4DFA-D0EFA5CA4FEB}"/>
+              </a:ext>
+            </a:extLst>
+          </p:cNvPr>
+          <p:cNvSpPr/>
+          <p:nvPr/>
+        </p:nvSpPr>
+        <p:spPr>
+          <a:xfrm>
+            <a:off x="0" y="4660903"/>
+            <a:ext cx="12192001" cy="524660"/>
+          </a:xfrm>
+          <a:prstGeom prst="rect">
+            <a:avLst/>
+          </a:prstGeom>
+          <a:solidFill>
+            <a:schemeClr val="tx1"/>
+          </a:solidFill>
+          <a:ln>
+            <a:noFill/>
+          </a:ln>
+        </p:spPr>
+        <p:style>
+          <a:lnRef idx="2">
+            <a:schemeClr val="accent1">
+              <a:shade val="50000"/>
+            </a:schemeClr>
+          </a:lnRef>
+          <a:fillRef idx="1">
+            <a:schemeClr val="accent1"/>
+          </a:fillRef>
+          <a:effectRef idx="0">
+            <a:schemeClr val="accent1"/>
+          </a:effectRef>
+          <a:fontRef idx="minor">
+            <a:schemeClr val="lt1"/>
+          </a:fontRef>
+        </p:style>
+        <p:txBody>
+          <a:bodyPr rtlCol="0" anchor="ctr"/>
+          <a:lstStyle/>
+          <a:p>
+            <a:r>
+              <a:rPr lang="en-NO" sz="2000" b="1" dirty="0">
+                <a:latin typeface="Calibri" panose="020F0502020204030204" pitchFamily="34" charset="0"/>
+                <a:cs typeface="Calibri" panose="020F0502020204030204" pitchFamily="34" charset="0"/>
+              </a:rPr>
+              <a:t>                                         DigiWells  HDD22</a:t>
+            </a:r>
+          </a:p>
+        </p:txBody>
+      </p:sp>
+    </p:spTree>
+    <p:extLst>
+      <p:ext uri="{BB962C8B-B14F-4D97-AF65-F5344CB8AC3E}">
+        <p14:creationId xmlns:p14="http://schemas.microsoft.com/office/powerpoint/2010/main" val="3192586416"/>
+      </p:ext>
+    </p:extLst>
+  </p:cSld>
+  <p:clrMapOvr>
+    <a:masterClrMapping/>
+  </p:clrMapOvr>
+</p:sld>
+</file>
+
+<file path=ppt/slides/slide8.xml><?xml version="1.0" encoding="utf-8"?>
+<p:sld xmlns:a="http://schemas.openxmlformats.org/drawingml/2006/main" xmlns:r="http://schemas.openxmlformats.org/officeDocument/2006/relationships" xmlns:p="http://schemas.openxmlformats.org/presentationml/2006/main">
+  <p:cSld>
+    <p:spTree>
+      <p:nvGrpSpPr>
+        <p:cNvPr id="1" name=""/>
+        <p:cNvGrpSpPr/>
+        <p:nvPr/>
+      </p:nvGrpSpPr>
+      <p:grpSpPr>
+        <a:xfrm>
+          <a:off x="0" y="0"/>
+          <a:ext cx="0" cy="0"/>
+          <a:chOff x="0" y="0"/>
+          <a:chExt cx="0" cy="0"/>
+        </a:xfrm>
+      </p:grpSpPr>
       <p:grpSp>
         <p:nvGrpSpPr>
           <p:cNvPr id="30" name="Group 29">

</xml_diff>